<commit_message>
changed modifiers and code en PPT
</commit_message>
<xml_diff>
--- a/PPT/04- Angular Component Tree.pptx
+++ b/PPT/04- Angular Component Tree.pptx
@@ -2701,7 +2701,7 @@
           <a:p>
             <a:fld id="{3684521C-F147-C24A-A391-648ECBD2901C}" type="datetime1">
               <a:rPr lang="en-US" smtClean="0"/>
-              <a:t>6/10/20</a:t>
+              <a:t>12/17/20</a:t>
             </a:fld>
             <a:endParaRPr lang="en-US"/>
           </a:p>
@@ -2855,7 +2855,7 @@
           <a:p>
             <a:fld id="{E850CB69-7D8B-9F4E-BED9-901DCAE946AB}" type="datetime1">
               <a:rPr lang="en-US" smtClean="0"/>
-              <a:t>6/10/20</a:t>
+              <a:t>12/17/20</a:t>
             </a:fld>
             <a:endParaRPr lang="en-US"/>
           </a:p>
@@ -3088,7 +3088,7 @@
           <a:p>
             <a:fld id="{FDA6B9DC-9839-E24A-9DBE-68BCC9C6D304}" type="datetime1">
               <a:rPr lang="en-US" smtClean="0"/>
-              <a:t>6/10/20</a:t>
+              <a:t>12/17/20</a:t>
             </a:fld>
             <a:endParaRPr lang="en-US"/>
           </a:p>
@@ -3213,7 +3213,7 @@
           <a:p>
             <a:fld id="{16B0123C-B19C-2541-A249-CC118E280FC0}" type="datetime1">
               <a:rPr lang="en-US" smtClean="0"/>
-              <a:t>6/10/20</a:t>
+              <a:t>12/17/20</a:t>
             </a:fld>
             <a:endParaRPr lang="en-US"/>
           </a:p>
@@ -3309,7 +3309,7 @@
           <a:p>
             <a:fld id="{7A20ED1D-FFB4-6144-9B3D-3C04FD3360E4}" type="datetime1">
               <a:rPr lang="en-US" smtClean="0"/>
-              <a:t>6/10/20</a:t>
+              <a:t>12/17/20</a:t>
             </a:fld>
             <a:endParaRPr lang="en-US"/>
           </a:p>
@@ -4161,7 +4161,7 @@
           <a:p>
             <a:fld id="{5ADC4E92-36BB-AA43-A533-B6B376F1612C}" type="datetime1">
               <a:rPr lang="en-US" smtClean="0"/>
-              <a:t>6/10/20</a:t>
+              <a:t>12/17/20</a:t>
             </a:fld>
             <a:endParaRPr lang="en-US"/>
           </a:p>
@@ -20091,6 +20091,13 @@
               </a:lnSpc>
             </a:pPr>
             <a:r>
+              <a:rPr lang="nl-NL" sz="1700" spc="-5" dirty="0">
+                <a:latin typeface="Consolas"/>
+                <a:cs typeface="Consolas"/>
+              </a:rPr>
+              <a:t>public </a:t>
+            </a:r>
+            <a:r>
               <a:rPr sz="1700" spc="-5" dirty="0">
                 <a:latin typeface="Consolas"/>
                 <a:cs typeface="Consolas"/>
@@ -48320,8 +48327,8 @@
         </p:nvSpPr>
         <p:spPr>
           <a:xfrm>
-            <a:off x="4282441" y="4159192"/>
-            <a:ext cx="1918979" cy="600740"/>
+            <a:off x="3917310" y="4159191"/>
+            <a:ext cx="2284111" cy="1222433"/>
           </a:xfrm>
           <a:prstGeom prst="roundRect">
             <a:avLst/>
@@ -48808,8 +48815,8 @@
         </p:nvSpPr>
         <p:spPr>
           <a:xfrm>
-            <a:off x="1752005" y="4159192"/>
-            <a:ext cx="1918979" cy="600740"/>
+            <a:off x="992747" y="4159191"/>
+            <a:ext cx="2678238" cy="1222433"/>
           </a:xfrm>
           <a:prstGeom prst="roundRect">
             <a:avLst/>
@@ -48872,8 +48879,8 @@
         </p:nvCxnSpPr>
         <p:spPr>
           <a:xfrm flipH="1">
-            <a:off x="2711495" y="3741803"/>
-            <a:ext cx="2466876" cy="417389"/>
+            <a:off x="2331866" y="3741803"/>
+            <a:ext cx="2846506" cy="417388"/>
           </a:xfrm>
           <a:prstGeom prst="straightConnector1">
             <a:avLst/>

</xml_diff>